<commit_message>
Fórmulas mapa conceptual MA_10_02_CO
</commit_message>
<xml_diff>
--- a/fuentes/contenidos/grado10/guion02/MAPA_CONCEPTUAL_MA_10_02_CO.pptx
+++ b/fuentes/contenidos/grado10/guion02/MAPA_CONCEPTUAL_MA_10_02_CO.pptx
@@ -450,7 +450,7 @@
           <a:p>
             <a:fld id="{5001C876-01F7-4317-94B9-1AE222133113}" type="datetimeFigureOut">
               <a:rPr lang="es-ES" smtClean="0"/>
-              <a:t>15/06/2016</a:t>
+              <a:t>16/06/2016</a:t>
             </a:fld>
             <a:endParaRPr lang="es-ES" dirty="0"/>
           </a:p>
@@ -2746,9 +2746,45 @@
           <a:lstStyle/>
           <a:p>
             <a:pPr algn="ctr"/>
+            <a:r>
+              <a:rPr lang="es-ES" sz="900" dirty="0" smtClean="0">
+                <a:solidFill>
+                  <a:srgbClr val="FF0000"/>
+                </a:solidFill>
+                <a:latin typeface="Arial" panose="020B0604020202020204" pitchFamily="34" charset="0"/>
+                <a:cs typeface="Arial" panose="020B0604020202020204" pitchFamily="34" charset="0"/>
+              </a:rPr>
+              <a:t>&lt;&lt;Mapa1&gt;&gt;</a:t>
+            </a:r>
+          </a:p>
+          <a:p>
+            <a:pPr algn="ctr"/>
+            <a:r>
+              <a:rPr lang="es-ES" sz="900" dirty="0" smtClean="0">
+                <a:solidFill>
+                  <a:srgbClr val="FF0000"/>
+                </a:solidFill>
+                <a:latin typeface="Arial" panose="020B0604020202020204" pitchFamily="34" charset="0"/>
+                <a:cs typeface="Arial" panose="020B0604020202020204" pitchFamily="34" charset="0"/>
+              </a:rPr>
+              <a:t>&lt;&lt;Mapa2&gt;&gt;</a:t>
+            </a:r>
+          </a:p>
+          <a:p>
+            <a:pPr algn="ctr"/>
+            <a:r>
+              <a:rPr lang="es-ES" sz="900" dirty="0" smtClean="0">
+                <a:solidFill>
+                  <a:srgbClr val="FF0000"/>
+                </a:solidFill>
+                <a:latin typeface="Arial" panose="020B0604020202020204" pitchFamily="34" charset="0"/>
+                <a:cs typeface="Arial" panose="020B0604020202020204" pitchFamily="34" charset="0"/>
+              </a:rPr>
+              <a:t>&lt;&lt;Mapa3&gt;&gt;</a:t>
+            </a:r>
             <a:endParaRPr lang="es-ES" sz="900" dirty="0">
               <a:solidFill>
-                <a:schemeClr val="tx1"/>
+                <a:srgbClr val="FF0000"/>
               </a:solidFill>
               <a:latin typeface="Arial" panose="020B0604020202020204" pitchFamily="34" charset="0"/>
               <a:cs typeface="Arial" panose="020B0604020202020204" pitchFamily="34" charset="0"/>
@@ -2756,96 +2792,6 @@
           </a:p>
         </p:txBody>
       </p:sp>
-      <p:pic>
-        <p:nvPicPr>
-          <p:cNvPr id="278" name="Imagen 277"/>
-          <p:cNvPicPr>
-            <a:picLocks noChangeAspect="1"/>
-          </p:cNvPicPr>
-          <p:nvPr/>
-        </p:nvPicPr>
-        <p:blipFill>
-          <a:blip r:embed="rId2" cstate="print">
-            <a:extLst>
-              <a:ext uri="{28A0092B-C50C-407E-A947-70E740481C1C}">
-                <a14:useLocalDpi xmlns:a14="http://schemas.microsoft.com/office/drawing/2010/main" val="0"/>
-              </a:ext>
-            </a:extLst>
-          </a:blip>
-          <a:stretch>
-            <a:fillRect/>
-          </a:stretch>
-        </p:blipFill>
-        <p:spPr>
-          <a:xfrm>
-            <a:off x="3252890" y="4512256"/>
-            <a:ext cx="1230669" cy="243882"/>
-          </a:xfrm>
-          <a:prstGeom prst="rect">
-            <a:avLst/>
-          </a:prstGeom>
-        </p:spPr>
-      </p:pic>
-      <p:pic>
-        <p:nvPicPr>
-          <p:cNvPr id="279" name="Imagen 278"/>
-          <p:cNvPicPr>
-            <a:picLocks noChangeAspect="1"/>
-          </p:cNvPicPr>
-          <p:nvPr/>
-        </p:nvPicPr>
-        <p:blipFill>
-          <a:blip r:embed="rId3" cstate="print">
-            <a:extLst>
-              <a:ext uri="{28A0092B-C50C-407E-A947-70E740481C1C}">
-                <a14:useLocalDpi xmlns:a14="http://schemas.microsoft.com/office/drawing/2010/main" val="0"/>
-              </a:ext>
-            </a:extLst>
-          </a:blip>
-          <a:stretch>
-            <a:fillRect/>
-          </a:stretch>
-        </p:blipFill>
-        <p:spPr>
-          <a:xfrm>
-            <a:off x="3250067" y="4833391"/>
-            <a:ext cx="1265960" cy="236595"/>
-          </a:xfrm>
-          <a:prstGeom prst="rect">
-            <a:avLst/>
-          </a:prstGeom>
-        </p:spPr>
-      </p:pic>
-      <p:pic>
-        <p:nvPicPr>
-          <p:cNvPr id="64" name="Imagen 63"/>
-          <p:cNvPicPr>
-            <a:picLocks noChangeAspect="1"/>
-          </p:cNvPicPr>
-          <p:nvPr/>
-        </p:nvPicPr>
-        <p:blipFill>
-          <a:blip r:embed="rId4" cstate="print">
-            <a:extLst>
-              <a:ext uri="{28A0092B-C50C-407E-A947-70E740481C1C}">
-                <a14:useLocalDpi xmlns:a14="http://schemas.microsoft.com/office/drawing/2010/main" val="0"/>
-              </a:ext>
-            </a:extLst>
-          </a:blip>
-          <a:stretch>
-            <a:fillRect/>
-          </a:stretch>
-        </p:blipFill>
-        <p:spPr>
-          <a:xfrm>
-            <a:off x="3257153" y="5138122"/>
-            <a:ext cx="1286075" cy="233180"/>
-          </a:xfrm>
-          <a:prstGeom prst="rect">
-            <a:avLst/>
-          </a:prstGeom>
-        </p:spPr>
-      </p:pic>
       <p:sp>
         <p:nvSpPr>
           <p:cNvPr id="213" name="CuadroTexto 212" descr="Conector entre nodos" title="conector"/>
@@ -4140,9 +4086,32 @@
           <a:lstStyle/>
           <a:p>
             <a:pPr algn="ctr"/>
+            <a:r>
+              <a:rPr lang="es-ES" sz="900" dirty="0" smtClean="0">
+                <a:solidFill>
+                  <a:srgbClr val="FF0000"/>
+                </a:solidFill>
+                <a:latin typeface="Arial" panose="020B0604020202020204" pitchFamily="34" charset="0"/>
+                <a:cs typeface="Arial" panose="020B0604020202020204" pitchFamily="34" charset="0"/>
+              </a:rPr>
+              <a:t>&lt;&lt;Mapa4&gt;&gt;</a:t>
+            </a:r>
+          </a:p>
+          <a:p>
+            <a:pPr algn="ctr"/>
+            <a:r>
+              <a:rPr lang="es-ES" sz="900" dirty="0" smtClean="0">
+                <a:solidFill>
+                  <a:srgbClr val="FF0000"/>
+                </a:solidFill>
+                <a:latin typeface="Arial" panose="020B0604020202020204" pitchFamily="34" charset="0"/>
+                <a:cs typeface="Arial" panose="020B0604020202020204" pitchFamily="34" charset="0"/>
+              </a:rPr>
+              <a:t>&lt;&lt;Mapa5&gt;&gt;</a:t>
+            </a:r>
             <a:endParaRPr lang="es-ES" sz="900" dirty="0">
               <a:solidFill>
-                <a:schemeClr val="tx1"/>
+                <a:srgbClr val="FF0000"/>
               </a:solidFill>
               <a:latin typeface="Arial" panose="020B0604020202020204" pitchFamily="34" charset="0"/>
               <a:cs typeface="Arial" panose="020B0604020202020204" pitchFamily="34" charset="0"/>
@@ -4150,66 +4119,6 @@
           </a:p>
         </p:txBody>
       </p:sp>
-      <p:pic>
-        <p:nvPicPr>
-          <p:cNvPr id="57" name="Imagen 56"/>
-          <p:cNvPicPr>
-            <a:picLocks noChangeAspect="1"/>
-          </p:cNvPicPr>
-          <p:nvPr/>
-        </p:nvPicPr>
-        <p:blipFill>
-          <a:blip r:embed="rId5" cstate="print">
-            <a:extLst>
-              <a:ext uri="{28A0092B-C50C-407E-A947-70E740481C1C}">
-                <a14:useLocalDpi xmlns:a14="http://schemas.microsoft.com/office/drawing/2010/main" val="0"/>
-              </a:ext>
-            </a:extLst>
-          </a:blip>
-          <a:stretch>
-            <a:fillRect/>
-          </a:stretch>
-        </p:blipFill>
-        <p:spPr>
-          <a:xfrm>
-            <a:off x="7632024" y="5033496"/>
-            <a:ext cx="528879" cy="240759"/>
-          </a:xfrm>
-          <a:prstGeom prst="rect">
-            <a:avLst/>
-          </a:prstGeom>
-        </p:spPr>
-      </p:pic>
-      <p:pic>
-        <p:nvPicPr>
-          <p:cNvPr id="58" name="Imagen 57"/>
-          <p:cNvPicPr>
-            <a:picLocks noChangeAspect="1"/>
-          </p:cNvPicPr>
-          <p:nvPr/>
-        </p:nvPicPr>
-        <p:blipFill>
-          <a:blip r:embed="rId6" cstate="print">
-            <a:extLst>
-              <a:ext uri="{28A0092B-C50C-407E-A947-70E740481C1C}">
-                <a14:useLocalDpi xmlns:a14="http://schemas.microsoft.com/office/drawing/2010/main" val="0"/>
-              </a:ext>
-            </a:extLst>
-          </a:blip>
-          <a:stretch>
-            <a:fillRect/>
-          </a:stretch>
-        </p:blipFill>
-        <p:spPr>
-          <a:xfrm>
-            <a:off x="7557733" y="5252078"/>
-            <a:ext cx="810436" cy="273106"/>
-          </a:xfrm>
-          <a:prstGeom prst="rect">
-            <a:avLst/>
-          </a:prstGeom>
-        </p:spPr>
-      </p:pic>
       <p:sp>
         <p:nvSpPr>
           <p:cNvPr id="134" name="CuadroTexto 133" descr="Conector entre nodos" title="conector"/>

</xml_diff>